<commit_message>
PPT and project zip
</commit_message>
<xml_diff>
--- a/Project/project ppt.pptx
+++ b/Project/project ppt.pptx
@@ -24086,7 +24086,7 @@
         <p:spPr>
           <a:xfrm>
             <a:off x="200464" y="4435301"/>
-            <a:ext cx="4371535" cy="1908215"/>
+            <a:ext cx="4371535" cy="2215991"/>
           </a:xfrm>
           <a:prstGeom prst="rect">
             <a:avLst/>
@@ -24125,7 +24125,7 @@
           <a:p>
             <a:r>
               <a:rPr lang="en-IN" sz="2000" b="1" dirty="0"/>
-              <a:t>AYUSH THAKUR (2017KUCP1053)</a:t>
+              <a:t>AYUSH KUMAR SINGH (2017KUCP1053)</a:t>
             </a:r>
           </a:p>
         </p:txBody>

</xml_diff>